<commit_message>
update lesson 5 slides and hw3
</commit_message>
<xml_diff>
--- a/resources/hw/genomic-data-visualization-HW_3.pptx
+++ b/resources/hw/genomic-data-visualization-HW_3.pptx
@@ -270,7 +270,7 @@
           <a:p>
             <a:fld id="{3B49BF8B-8FD1-1748-B518-B651293E6FA0}" type="datetimeFigureOut">
               <a:rPr lang="en-US" smtClean="0"/>
-              <a:t>2/2/23</a:t>
+              <a:t>2/1/24</a:t>
             </a:fld>
             <a:endParaRPr lang="en-US"/>
           </a:p>
@@ -440,7 +440,7 @@
           <a:p>
             <a:fld id="{3B49BF8B-8FD1-1748-B518-B651293E6FA0}" type="datetimeFigureOut">
               <a:rPr lang="en-US" smtClean="0"/>
-              <a:t>2/2/23</a:t>
+              <a:t>2/1/24</a:t>
             </a:fld>
             <a:endParaRPr lang="en-US"/>
           </a:p>
@@ -620,7 +620,7 @@
           <a:p>
             <a:fld id="{3B49BF8B-8FD1-1748-B518-B651293E6FA0}" type="datetimeFigureOut">
               <a:rPr lang="en-US" smtClean="0"/>
-              <a:t>2/2/23</a:t>
+              <a:t>2/1/24</a:t>
             </a:fld>
             <a:endParaRPr lang="en-US"/>
           </a:p>
@@ -790,7 +790,7 @@
           <a:p>
             <a:fld id="{3B49BF8B-8FD1-1748-B518-B651293E6FA0}" type="datetimeFigureOut">
               <a:rPr lang="en-US" smtClean="0"/>
-              <a:t>2/2/23</a:t>
+              <a:t>2/1/24</a:t>
             </a:fld>
             <a:endParaRPr lang="en-US"/>
           </a:p>
@@ -1050,7 +1050,7 @@
           <a:p>
             <a:fld id="{3B49BF8B-8FD1-1748-B518-B651293E6FA0}" type="datetimeFigureOut">
               <a:rPr lang="en-US" smtClean="0"/>
-              <a:t>2/2/23</a:t>
+              <a:t>2/1/24</a:t>
             </a:fld>
             <a:endParaRPr lang="en-US"/>
           </a:p>
@@ -1282,7 +1282,7 @@
           <a:p>
             <a:fld id="{3B49BF8B-8FD1-1748-B518-B651293E6FA0}" type="datetimeFigureOut">
               <a:rPr lang="en-US" smtClean="0"/>
-              <a:t>2/2/23</a:t>
+              <a:t>2/1/24</a:t>
             </a:fld>
             <a:endParaRPr lang="en-US"/>
           </a:p>
@@ -1637,7 +1637,7 @@
           <a:p>
             <a:fld id="{3B49BF8B-8FD1-1748-B518-B651293E6FA0}" type="datetimeFigureOut">
               <a:rPr lang="en-US" smtClean="0"/>
-              <a:t>2/2/23</a:t>
+              <a:t>2/1/24</a:t>
             </a:fld>
             <a:endParaRPr lang="en-US"/>
           </a:p>
@@ -1778,7 +1778,7 @@
           <a:p>
             <a:fld id="{3B49BF8B-8FD1-1748-B518-B651293E6FA0}" type="datetimeFigureOut">
               <a:rPr lang="en-US" smtClean="0"/>
-              <a:t>2/2/23</a:t>
+              <a:t>2/1/24</a:t>
             </a:fld>
             <a:endParaRPr lang="en-US"/>
           </a:p>
@@ -1873,7 +1873,7 @@
           <a:p>
             <a:fld id="{3B49BF8B-8FD1-1748-B518-B651293E6FA0}" type="datetimeFigureOut">
               <a:rPr lang="en-US" smtClean="0"/>
-              <a:t>2/2/23</a:t>
+              <a:t>2/1/24</a:t>
             </a:fld>
             <a:endParaRPr lang="en-US"/>
           </a:p>
@@ -2230,7 +2230,7 @@
           <a:p>
             <a:fld id="{3B49BF8B-8FD1-1748-B518-B651293E6FA0}" type="datetimeFigureOut">
               <a:rPr lang="en-US" smtClean="0"/>
-              <a:t>2/2/23</a:t>
+              <a:t>2/1/24</a:t>
             </a:fld>
             <a:endParaRPr lang="en-US"/>
           </a:p>
@@ -2548,7 +2548,7 @@
           <a:p>
             <a:fld id="{3B49BF8B-8FD1-1748-B518-B651293E6FA0}" type="datetimeFigureOut">
               <a:rPr lang="en-US" smtClean="0"/>
-              <a:t>2/2/23</a:t>
+              <a:t>2/1/24</a:t>
             </a:fld>
             <a:endParaRPr lang="en-US"/>
           </a:p>
@@ -2793,7 +2793,7 @@
           <a:p>
             <a:fld id="{3B49BF8B-8FD1-1748-B518-B651293E6FA0}" type="datetimeFigureOut">
               <a:rPr lang="en-US" smtClean="0"/>
-              <a:t>2/2/23</a:t>
+              <a:t>2/1/24</a:t>
             </a:fld>
             <a:endParaRPr lang="en-US"/>
           </a:p>
@@ -3586,13 +3586,13 @@
         </p:nvSpPr>
         <p:spPr>
           <a:xfrm>
-            <a:off x="1706062" y="2291262"/>
-            <a:ext cx="8779512" cy="2879256"/>
+            <a:off x="1706062" y="1843590"/>
+            <a:ext cx="8779512" cy="3560748"/>
           </a:xfrm>
         </p:spPr>
         <p:txBody>
           <a:bodyPr>
-            <a:normAutofit fontScale="77500" lnSpcReduction="20000"/>
+            <a:normAutofit fontScale="92500" lnSpcReduction="20000"/>
           </a:bodyPr>
           <a:lstStyle/>
           <a:p>
@@ -3621,7 +3621,7 @@
                 <a:effectLst/>
                 <a:latin typeface="-apple-system"/>
               </a:rPr>
-              <a:t>Should I normalize and/or transform the gene expression data (e.g. log and/or scale) prior to dimensionality reduction?</a:t>
+              <a:t>What’s the difference if I perform linear or nonlinear dimensionality reduction to visualize my cells in 2D?</a:t>
             </a:r>
           </a:p>
           <a:p>
@@ -3634,7 +3634,7 @@
                 <a:effectLst/>
                 <a:latin typeface="-apple-system"/>
               </a:rPr>
-              <a:t>Should I perform non-linear dimensionality reduction on genes or PCs?</a:t>
+              <a:t>What happens if I do or not not normalize and/or transform the gene expression data (e.g. log and/or scale) prior to dimensionality reduction?</a:t>
             </a:r>
           </a:p>
           <a:p>
@@ -3647,7 +3647,33 @@
                 <a:effectLst/>
                 <a:latin typeface="-apple-system"/>
               </a:rPr>
-              <a:t>If I perform non-linear dimensionality reduction on PCs, how many PCs should I use?</a:t>
+              <a:t>What happens if I perform non-linear dimensionality reduction on genes or PCs?</a:t>
+            </a:r>
+          </a:p>
+          <a:p>
+            <a:pPr algn="l">
+              <a:buFont typeface="+mj-lt"/>
+              <a:buAutoNum type="arabicPeriod"/>
+            </a:pPr>
+            <a:r>
+              <a:rPr lang="en-US" sz="1600" b="0" i="0" dirty="0">
+                <a:effectLst/>
+                <a:latin typeface="-apple-system"/>
+              </a:rPr>
+              <a:t>If I perform non-linear dimensionality reduction on PCs, </a:t>
+            </a:r>
+            <a:r>
+              <a:rPr lang="en-US" sz="1600" dirty="0">
+                <a:latin typeface="-apple-system"/>
+              </a:rPr>
+              <a:t>what happens when I vary how</a:t>
+            </a:r>
+            <a:r>
+              <a:rPr lang="en-US" sz="1600" b="0" i="0" dirty="0">
+                <a:effectLst/>
+                <a:latin typeface="-apple-system"/>
+              </a:rPr>
+              <a:t> many PCs should I use?</a:t>
             </a:r>
           </a:p>
           <a:p>
@@ -3687,60 +3713,23 @@
               </a:rPr>
               <a:t>your data visualization using vocabulary terms from Lesson 1.</a:t>
             </a:r>
-          </a:p>
-          <a:p>
-            <a:pPr marL="0" indent="0">
-              <a:buNone/>
-            </a:pPr>
-            <a:endParaRPr lang="en-US" sz="1500" dirty="0">
-              <a:solidFill>
-                <a:srgbClr val="404040"/>
-              </a:solidFill>
-            </a:endParaRPr>
-          </a:p>
-          <a:p>
-            <a:pPr marL="0" indent="0">
-              <a:lnSpc>
-                <a:spcPct val="90000"/>
-              </a:lnSpc>
-              <a:buNone/>
-            </a:pPr>
+            <a:r>
+              <a:rPr lang="en-US" sz="1500" b="0" i="0" dirty="0">
+                <a:solidFill>
+                  <a:srgbClr val="404040"/>
+                </a:solidFill>
+                <a:effectLst/>
+                <a:latin typeface="-apple-system"/>
+              </a:rPr>
+              <a:t> </a:t>
+            </a:r>
             <a:r>
               <a:rPr lang="en-US" sz="1500" dirty="0">
                 <a:solidFill>
                   <a:srgbClr val="404040"/>
                 </a:solidFill>
               </a:rPr>
-              <a:t>You must include the entire code you used to generate the figure so that it can be reproduced. </a:t>
-            </a:r>
-          </a:p>
-          <a:p>
-            <a:pPr marL="0" indent="0">
-              <a:lnSpc>
-                <a:spcPct val="90000"/>
-              </a:lnSpc>
-              <a:buNone/>
-            </a:pPr>
-            <a:endParaRPr lang="en-US" sz="1500" dirty="0">
-              <a:solidFill>
-                <a:srgbClr val="404040"/>
-              </a:solidFill>
-            </a:endParaRPr>
-          </a:p>
-          <a:p>
-            <a:pPr marL="0" indent="0">
-              <a:lnSpc>
-                <a:spcPct val="90000"/>
-              </a:lnSpc>
-              <a:buNone/>
-            </a:pPr>
-            <a:r>
-              <a:rPr lang="en-US" sz="1500" dirty="0">
-                <a:solidFill>
-                  <a:srgbClr val="404040"/>
-                </a:solidFill>
-              </a:rPr>
-              <a:t>You must provide attribution to external resources referenced (if any) in writing your code. </a:t>
+              <a:t>You must include the entire code you used to generate the figure so that it can be reproduced.  You must provide attribution to external resources referenced (if any) in writing your code. </a:t>
             </a:r>
           </a:p>
         </p:txBody>

</xml_diff>